<commit_message>
added 18th oct slides
</commit_message>
<xml_diff>
--- a/MEMUGScotland-Resources/Slides/31st-August-2022.pptx
+++ b/MEMUGScotland-Resources/Slides/31st-August-2022.pptx
@@ -5544,7 +5544,7 @@
         </p:blipFill>
         <p:spPr>
           <a:xfrm>
-            <a:off x="0" y="1104900"/>
+            <a:off x="3022192" y="2097123"/>
             <a:ext cx="3162300" cy="3162300"/>
           </a:xfrm>
           <a:prstGeom prst="rect">
@@ -5570,8 +5570,8 @@
         </p:nvSpPr>
         <p:spPr>
           <a:xfrm>
-            <a:off x="2447927" y="1430390"/>
-            <a:ext cx="11201398" cy="2663720"/>
+            <a:off x="220920" y="1049390"/>
+            <a:ext cx="5786590" cy="1696234"/>
           </a:xfrm>
         </p:spPr>
         <p:txBody>
@@ -5603,13 +5603,6 @@
           <a:p>
             <a:pPr algn="l"/>
             <a:endParaRPr lang="en-GB" sz="2800" dirty="0"/>
-          </a:p>
-          <a:p>
-            <a:pPr algn="l"/>
-            <a:r>
-              <a:rPr lang="en-GB" sz="2800" dirty="0"/>
-              <a:t>Session – Why Intune Filters &gt; AAD Dynamic Groups</a:t>
-            </a:r>
           </a:p>
         </p:txBody>
       </p:sp>
@@ -5641,7 +5634,7 @@
         </p:blipFill>
         <p:spPr>
           <a:xfrm>
-            <a:off x="2500225" y="2381250"/>
+            <a:off x="302715" y="1992875"/>
             <a:ext cx="609600" cy="609600"/>
           </a:xfrm>
           <a:prstGeom prst="rect">
@@ -5722,6 +5715,47 @@
           </a:fontRef>
         </p:style>
       </p:cxnSp>
+      <p:sp>
+        <p:nvSpPr>
+          <p:cNvPr id="5" name="TextBox 4">
+            <a:extLst>
+              <a:ext uri="{FF2B5EF4-FFF2-40B4-BE49-F238E27FC236}">
+                <a16:creationId xmlns:a16="http://schemas.microsoft.com/office/drawing/2014/main" id="{2F08B819-F705-0093-8073-3D425A85E475}"/>
+              </a:ext>
+            </a:extLst>
+          </p:cNvPr>
+          <p:cNvSpPr txBox="1"/>
+          <p:nvPr/>
+        </p:nvSpPr>
+        <p:spPr>
+          <a:xfrm>
+            <a:off x="6264686" y="1681624"/>
+            <a:ext cx="5442155" cy="830997"/>
+          </a:xfrm>
+          <a:prstGeom prst="rect">
+            <a:avLst/>
+          </a:prstGeom>
+          <a:noFill/>
+        </p:spPr>
+        <p:txBody>
+          <a:bodyPr wrap="square" rtlCol="0">
+            <a:spAutoFit/>
+          </a:bodyPr>
+          <a:lstStyle/>
+          <a:p>
+            <a:r>
+              <a:rPr lang="en-GB" sz="2400" dirty="0"/>
+              <a:t>Session:</a:t>
+            </a:r>
+          </a:p>
+          <a:p>
+            <a:r>
+              <a:rPr lang="en-GB" sz="2400" dirty="0"/>
+              <a:t>Why Intune Filters &gt; AAD Dynamic Groups</a:t>
+            </a:r>
+          </a:p>
+        </p:txBody>
+      </p:sp>
     </p:spTree>
     <p:extLst>
       <p:ext uri="{BB962C8B-B14F-4D97-AF65-F5344CB8AC3E}">

</xml_diff>